<commit_message>
changing the title of the presentation to what was advertised in the devcon titles
</commit_message>
<xml_diff>
--- a/work-BufferOverflowPresentation.pptx
+++ b/work-BufferOverflowPresentation.pptx
@@ -303,7 +303,7 @@
           <a:p>
             <a:fld id="{9DED5714-D740-4F89-AAD5-E3BC8B06EDCA}" type="datetimeFigureOut">
               <a:rPr lang="en-US" smtClean="0"/>
-              <a:t>5/24/12</a:t>
+              <a:t>5/25/12</a:t>
             </a:fld>
             <a:endParaRPr lang="en-US"/>
           </a:p>
@@ -8172,7 +8172,7 @@
           <a:p>
             <a:fld id="{FB76FE03-F4FF-4405-A4BA-F447F9618E72}" type="datetimeFigureOut">
               <a:rPr lang="en-US" smtClean="0"/>
-              <a:t>5/24/12</a:t>
+              <a:t>5/25/12</a:t>
             </a:fld>
             <a:endParaRPr lang="en-US"/>
           </a:p>
@@ -8437,7 +8437,7 @@
           <a:p>
             <a:fld id="{FB76FE03-F4FF-4405-A4BA-F447F9618E72}" type="datetimeFigureOut">
               <a:rPr lang="en-US" smtClean="0"/>
-              <a:t>5/24/12</a:t>
+              <a:t>5/25/12</a:t>
             </a:fld>
             <a:endParaRPr lang="en-US"/>
           </a:p>
@@ -8612,7 +8612,7 @@
           <a:p>
             <a:fld id="{FB76FE03-F4FF-4405-A4BA-F447F9618E72}" type="datetimeFigureOut">
               <a:rPr lang="en-US" smtClean="0"/>
-              <a:t>5/24/12</a:t>
+              <a:t>5/25/12</a:t>
             </a:fld>
             <a:endParaRPr lang="en-US"/>
           </a:p>
@@ -8777,7 +8777,7 @@
           <a:p>
             <a:fld id="{FB76FE03-F4FF-4405-A4BA-F447F9618E72}" type="datetimeFigureOut">
               <a:rPr lang="en-US" smtClean="0"/>
-              <a:t>5/24/12</a:t>
+              <a:t>5/25/12</a:t>
             </a:fld>
             <a:endParaRPr lang="en-US"/>
           </a:p>
@@ -9026,7 +9026,7 @@
           <a:p>
             <a:fld id="{FB76FE03-F4FF-4405-A4BA-F447F9618E72}" type="datetimeFigureOut">
               <a:rPr lang="en-US" smtClean="0"/>
-              <a:t>5/24/12</a:t>
+              <a:t>5/25/12</a:t>
             </a:fld>
             <a:endParaRPr lang="en-US"/>
           </a:p>
@@ -9309,7 +9309,7 @@
           <a:p>
             <a:fld id="{FB76FE03-F4FF-4405-A4BA-F447F9618E72}" type="datetimeFigureOut">
               <a:rPr lang="en-US" smtClean="0"/>
-              <a:t>5/24/12</a:t>
+              <a:t>5/25/12</a:t>
             </a:fld>
             <a:endParaRPr lang="en-US"/>
           </a:p>
@@ -9748,7 +9748,7 @@
           <a:p>
             <a:fld id="{FB76FE03-F4FF-4405-A4BA-F447F9618E72}" type="datetimeFigureOut">
               <a:rPr lang="en-US" smtClean="0"/>
-              <a:t>5/24/12</a:t>
+              <a:t>5/25/12</a:t>
             </a:fld>
             <a:endParaRPr lang="en-US"/>
           </a:p>
@@ -9861,7 +9861,7 @@
           <a:p>
             <a:fld id="{FB76FE03-F4FF-4405-A4BA-F447F9618E72}" type="datetimeFigureOut">
               <a:rPr lang="en-US" smtClean="0"/>
-              <a:t>5/24/12</a:t>
+              <a:t>5/25/12</a:t>
             </a:fld>
             <a:endParaRPr lang="en-US"/>
           </a:p>
@@ -9951,7 +9951,7 @@
           <a:p>
             <a:fld id="{FB76FE03-F4FF-4405-A4BA-F447F9618E72}" type="datetimeFigureOut">
               <a:rPr lang="en-US" smtClean="0"/>
-              <a:t>5/24/12</a:t>
+              <a:t>5/25/12</a:t>
             </a:fld>
             <a:endParaRPr lang="en-US"/>
           </a:p>
@@ -10193,7 +10193,7 @@
           <a:p>
             <a:fld id="{FB76FE03-F4FF-4405-A4BA-F447F9618E72}" type="datetimeFigureOut">
               <a:rPr lang="en-US" smtClean="0"/>
-              <a:t>5/24/12</a:t>
+              <a:t>5/25/12</a:t>
             </a:fld>
             <a:endParaRPr lang="en-US"/>
           </a:p>
@@ -10487,7 +10487,7 @@
           <a:p>
             <a:fld id="{FB76FE03-F4FF-4405-A4BA-F447F9618E72}" type="datetimeFigureOut">
               <a:rPr lang="en-US" smtClean="0"/>
-              <a:t>5/24/12</a:t>
+              <a:t>5/25/12</a:t>
             </a:fld>
             <a:endParaRPr lang="en-US"/>
           </a:p>
@@ -10781,7 +10781,7 @@
           <a:p>
             <a:fld id="{FB76FE03-F4FF-4405-A4BA-F447F9618E72}" type="datetimeFigureOut">
               <a:rPr lang="en-US" smtClean="0"/>
-              <a:t>5/24/12</a:t>
+              <a:t>5/25/12</a:t>
             </a:fld>
             <a:endParaRPr lang="en-US"/>
           </a:p>
@@ -11279,13 +11279,13 @@
         <p:spPr/>
         <p:txBody>
           <a:bodyPr>
-            <a:normAutofit/>
+            <a:normAutofit fontScale="90000"/>
           </a:bodyPr>
           <a:lstStyle/>
           <a:p>
             <a:r>
               <a:rPr lang="en-US" dirty="0" smtClean="0"/>
-              <a:t>Buffer Overflow Attacks</a:t>
+              <a:t>Smashing the stack like its 1997</a:t>
             </a:r>
             <a:endParaRPr lang="en-US" dirty="0"/>
           </a:p>
@@ -11303,7 +11303,7 @@
         </p:nvSpPr>
         <p:spPr>
           <a:xfrm>
-            <a:off x="457200" y="4800600"/>
+            <a:off x="457200" y="4876800"/>
             <a:ext cx="6858000" cy="1295400"/>
           </a:xfrm>
         </p:spPr>
@@ -11331,15 +11331,7 @@
           <a:p>
             <a:r>
               <a:rPr lang="en-US" dirty="0" smtClean="0"/>
-              <a:t>Meredith </a:t>
-            </a:r>
-            <a:r>
-              <a:rPr lang="en-US" dirty="0" smtClean="0"/>
-              <a:t>Schmidt, Andrew </a:t>
-            </a:r>
-            <a:r>
-              <a:rPr lang="en-US" dirty="0" smtClean="0"/>
-              <a:t>Rockwell</a:t>
+              <a:t>Meredith Schmidt, Andrew Rockwell</a:t>
             </a:r>
             <a:endParaRPr lang="en-US" dirty="0"/>
           </a:p>
@@ -11352,8 +11344,8 @@
           <p:nvPr/>
         </p:nvSpPr>
         <p:spPr>
-          <a:xfrm rot="19651763">
-            <a:off x="6307747" y="5103712"/>
+          <a:xfrm rot="18890082">
+            <a:off x="6158751" y="5056182"/>
             <a:ext cx="1524000" cy="381000"/>
           </a:xfrm>
           <a:prstGeom prst="leftArrow">
@@ -11393,11 +11385,11 @@
   <p:clrMapOvr>
     <a:masterClrMapping/>
   </p:clrMapOvr>
-  <mc:AlternateContent xmlns:mc="http://schemas.openxmlformats.org/markup-compatibility/2006">
-    <mc:Choice xmlns:p14="http://schemas.microsoft.com/office/powerpoint/2010/main" Requires="p14">
+  <mc:AlternateContent xmlns:mc="http://schemas.openxmlformats.org/markup-compatibility/2006" xmlns:p14="http://schemas.microsoft.com/office/powerpoint/2010/main">
+    <mc:Choice Requires="p14">
       <p:transition spd="slow" p14:dur="2000"/>
     </mc:Choice>
-    <mc:Fallback>
+    <mc:Fallback xmlns="">
       <p:transition xmlns:p14="http://schemas.microsoft.com/office/powerpoint/2010/main" spd="slow"/>
     </mc:Fallback>
   </mc:AlternateContent>
@@ -11839,11 +11831,11 @@
   <p:clrMapOvr>
     <a:masterClrMapping/>
   </p:clrMapOvr>
-  <mc:AlternateContent xmlns:mc="http://schemas.openxmlformats.org/markup-compatibility/2006">
-    <mc:Choice xmlns:p14="http://schemas.microsoft.com/office/powerpoint/2010/main" Requires="p14">
+  <mc:AlternateContent xmlns:mc="http://schemas.openxmlformats.org/markup-compatibility/2006" xmlns:p14="http://schemas.microsoft.com/office/powerpoint/2010/main">
+    <mc:Choice Requires="p14">
       <p:transition spd="slow" p14:dur="2000"/>
     </mc:Choice>
-    <mc:Fallback>
+    <mc:Fallback xmlns="">
       <p:transition xmlns:p14="http://schemas.microsoft.com/office/powerpoint/2010/main" spd="slow"/>
     </mc:Fallback>
   </mc:AlternateContent>
@@ -13595,11 +13587,11 @@
   <p:clrMapOvr>
     <a:masterClrMapping/>
   </p:clrMapOvr>
-  <mc:AlternateContent xmlns:mc="http://schemas.openxmlformats.org/markup-compatibility/2006">
-    <mc:Choice xmlns:p14="http://schemas.microsoft.com/office/powerpoint/2010/main" Requires="p14">
+  <mc:AlternateContent xmlns:mc="http://schemas.openxmlformats.org/markup-compatibility/2006" xmlns:p14="http://schemas.microsoft.com/office/powerpoint/2010/main">
+    <mc:Choice Requires="p14">
       <p:transition spd="slow" p14:dur="2000"/>
     </mc:Choice>
-    <mc:Fallback>
+    <mc:Fallback xmlns="">
       <p:transition xmlns:p14="http://schemas.microsoft.com/office/powerpoint/2010/main" spd="slow"/>
     </mc:Fallback>
   </mc:AlternateContent>
@@ -15019,11 +15011,11 @@
   <p:clrMapOvr>
     <a:masterClrMapping/>
   </p:clrMapOvr>
-  <mc:AlternateContent xmlns:mc="http://schemas.openxmlformats.org/markup-compatibility/2006">
-    <mc:Choice xmlns:p14="http://schemas.microsoft.com/office/powerpoint/2010/main" Requires="p14">
+  <mc:AlternateContent xmlns:mc="http://schemas.openxmlformats.org/markup-compatibility/2006" xmlns:p14="http://schemas.microsoft.com/office/powerpoint/2010/main">
+    <mc:Choice Requires="p14">
       <p:transition spd="slow" p14:dur="2000"/>
     </mc:Choice>
-    <mc:Fallback>
+    <mc:Fallback xmlns="">
       <p:transition xmlns:p14="http://schemas.microsoft.com/office/powerpoint/2010/main" spd="slow"/>
     </mc:Fallback>
   </mc:AlternateContent>
@@ -16472,11 +16464,11 @@
   <p:clrMapOvr>
     <a:masterClrMapping/>
   </p:clrMapOvr>
-  <mc:AlternateContent xmlns:mc="http://schemas.openxmlformats.org/markup-compatibility/2006">
-    <mc:Choice xmlns:p14="http://schemas.microsoft.com/office/powerpoint/2010/main" Requires="p14">
+  <mc:AlternateContent xmlns:mc="http://schemas.openxmlformats.org/markup-compatibility/2006" xmlns:p14="http://schemas.microsoft.com/office/powerpoint/2010/main">
+    <mc:Choice Requires="p14">
       <p:transition spd="slow" p14:dur="2000"/>
     </mc:Choice>
-    <mc:Fallback>
+    <mc:Fallback xmlns="">
       <p:transition xmlns:p14="http://schemas.microsoft.com/office/powerpoint/2010/main" spd="slow"/>
     </mc:Fallback>
   </mc:AlternateContent>
@@ -17948,11 +17940,11 @@
   <p:clrMapOvr>
     <a:masterClrMapping/>
   </p:clrMapOvr>
-  <mc:AlternateContent xmlns:mc="http://schemas.openxmlformats.org/markup-compatibility/2006">
-    <mc:Choice xmlns:p14="http://schemas.microsoft.com/office/powerpoint/2010/main" Requires="p14">
+  <mc:AlternateContent xmlns:mc="http://schemas.openxmlformats.org/markup-compatibility/2006" xmlns:p14="http://schemas.microsoft.com/office/powerpoint/2010/main">
+    <mc:Choice Requires="p14">
       <p:transition spd="slow" p14:dur="2000"/>
     </mc:Choice>
-    <mc:Fallback>
+    <mc:Fallback xmlns="">
       <p:transition xmlns:p14="http://schemas.microsoft.com/office/powerpoint/2010/main" spd="slow"/>
     </mc:Fallback>
   </mc:AlternateContent>
@@ -19448,11 +19440,11 @@
   <p:clrMapOvr>
     <a:masterClrMapping/>
   </p:clrMapOvr>
-  <mc:AlternateContent xmlns:mc="http://schemas.openxmlformats.org/markup-compatibility/2006">
-    <mc:Choice xmlns:p14="http://schemas.microsoft.com/office/powerpoint/2010/main" Requires="p14">
+  <mc:AlternateContent xmlns:mc="http://schemas.openxmlformats.org/markup-compatibility/2006" xmlns:p14="http://schemas.microsoft.com/office/powerpoint/2010/main">
+    <mc:Choice Requires="p14">
       <p:transition spd="slow" p14:dur="2000"/>
     </mc:Choice>
-    <mc:Fallback>
+    <mc:Fallback xmlns="">
       <p:transition xmlns:p14="http://schemas.microsoft.com/office/powerpoint/2010/main" spd="slow"/>
     </mc:Fallback>
   </mc:AlternateContent>
@@ -21206,11 +21198,11 @@
   <p:clrMapOvr>
     <a:masterClrMapping/>
   </p:clrMapOvr>
-  <mc:AlternateContent xmlns:mc="http://schemas.openxmlformats.org/markup-compatibility/2006">
-    <mc:Choice xmlns:p14="http://schemas.microsoft.com/office/powerpoint/2010/main" Requires="p14">
+  <mc:AlternateContent xmlns:mc="http://schemas.openxmlformats.org/markup-compatibility/2006" xmlns:p14="http://schemas.microsoft.com/office/powerpoint/2010/main">
+    <mc:Choice Requires="p14">
       <p:transition spd="slow" p14:dur="2000"/>
     </mc:Choice>
-    <mc:Fallback>
+    <mc:Fallback xmlns="">
       <p:transition xmlns:p14="http://schemas.microsoft.com/office/powerpoint/2010/main" spd="slow"/>
     </mc:Fallback>
   </mc:AlternateContent>
@@ -22496,11 +22488,11 @@
   <p:clrMapOvr>
     <a:masterClrMapping/>
   </p:clrMapOvr>
-  <mc:AlternateContent xmlns:mc="http://schemas.openxmlformats.org/markup-compatibility/2006">
-    <mc:Choice xmlns:p14="http://schemas.microsoft.com/office/powerpoint/2010/main" Requires="p14">
+  <mc:AlternateContent xmlns:mc="http://schemas.openxmlformats.org/markup-compatibility/2006" xmlns:p14="http://schemas.microsoft.com/office/powerpoint/2010/main">
+    <mc:Choice Requires="p14">
       <p:transition spd="slow" p14:dur="2000"/>
     </mc:Choice>
-    <mc:Fallback>
+    <mc:Fallback xmlns="">
       <p:transition xmlns:p14="http://schemas.microsoft.com/office/powerpoint/2010/main" spd="slow"/>
     </mc:Fallback>
   </mc:AlternateContent>
@@ -23868,11 +23860,11 @@
   <p:clrMapOvr>
     <a:masterClrMapping/>
   </p:clrMapOvr>
-  <mc:AlternateContent xmlns:mc="http://schemas.openxmlformats.org/markup-compatibility/2006">
-    <mc:Choice xmlns:p14="http://schemas.microsoft.com/office/powerpoint/2010/main" Requires="p14">
+  <mc:AlternateContent xmlns:mc="http://schemas.openxmlformats.org/markup-compatibility/2006" xmlns:p14="http://schemas.microsoft.com/office/powerpoint/2010/main">
+    <mc:Choice Requires="p14">
       <p:transition spd="slow" p14:dur="2000"/>
     </mc:Choice>
-    <mc:Fallback>
+    <mc:Fallback xmlns="">
       <p:transition xmlns:p14="http://schemas.microsoft.com/office/powerpoint/2010/main" spd="slow"/>
     </mc:Fallback>
   </mc:AlternateContent>
@@ -25014,11 +25006,11 @@
   <p:clrMapOvr>
     <a:masterClrMapping/>
   </p:clrMapOvr>
-  <mc:AlternateContent xmlns:mc="http://schemas.openxmlformats.org/markup-compatibility/2006">
-    <mc:Choice xmlns:p14="http://schemas.microsoft.com/office/powerpoint/2010/main" Requires="p14">
+  <mc:AlternateContent xmlns:mc="http://schemas.openxmlformats.org/markup-compatibility/2006" xmlns:p14="http://schemas.microsoft.com/office/powerpoint/2010/main">
+    <mc:Choice Requires="p14">
       <p:transition spd="slow" p14:dur="2000"/>
     </mc:Choice>
-    <mc:Fallback>
+    <mc:Fallback xmlns="">
       <p:transition xmlns:p14="http://schemas.microsoft.com/office/powerpoint/2010/main" spd="slow"/>
     </mc:Fallback>
   </mc:AlternateContent>
@@ -25227,11 +25219,11 @@
   <p:clrMapOvr>
     <a:masterClrMapping/>
   </p:clrMapOvr>
-  <mc:AlternateContent xmlns:mc="http://schemas.openxmlformats.org/markup-compatibility/2006">
-    <mc:Choice xmlns:p14="http://schemas.microsoft.com/office/powerpoint/2010/main" Requires="p14">
+  <mc:AlternateContent xmlns:mc="http://schemas.openxmlformats.org/markup-compatibility/2006" xmlns:p14="http://schemas.microsoft.com/office/powerpoint/2010/main">
+    <mc:Choice Requires="p14">
       <p:transition spd="slow" p14:dur="2000"/>
     </mc:Choice>
-    <mc:Fallback>
+    <mc:Fallback xmlns="">
       <p:transition xmlns:p14="http://schemas.microsoft.com/office/powerpoint/2010/main" spd="slow"/>
     </mc:Fallback>
   </mc:AlternateContent>
@@ -26561,11 +26553,11 @@
   <p:clrMapOvr>
     <a:masterClrMapping/>
   </p:clrMapOvr>
-  <mc:AlternateContent xmlns:mc="http://schemas.openxmlformats.org/markup-compatibility/2006">
-    <mc:Choice xmlns:p14="http://schemas.microsoft.com/office/powerpoint/2010/main" Requires="p14">
+  <mc:AlternateContent xmlns:mc="http://schemas.openxmlformats.org/markup-compatibility/2006" xmlns:p14="http://schemas.microsoft.com/office/powerpoint/2010/main">
+    <mc:Choice Requires="p14">
       <p:transition spd="slow" p14:dur="2000"/>
     </mc:Choice>
-    <mc:Fallback>
+    <mc:Fallback xmlns="">
       <p:transition xmlns:p14="http://schemas.microsoft.com/office/powerpoint/2010/main" spd="slow"/>
     </mc:Fallback>
   </mc:AlternateContent>
@@ -27932,11 +27924,11 @@
   <p:clrMapOvr>
     <a:masterClrMapping/>
   </p:clrMapOvr>
-  <mc:AlternateContent xmlns:mc="http://schemas.openxmlformats.org/markup-compatibility/2006">
-    <mc:Choice xmlns:p14="http://schemas.microsoft.com/office/powerpoint/2010/main" Requires="p14">
+  <mc:AlternateContent xmlns:mc="http://schemas.openxmlformats.org/markup-compatibility/2006" xmlns:p14="http://schemas.microsoft.com/office/powerpoint/2010/main">
+    <mc:Choice Requires="p14">
       <p:transition spd="slow" p14:dur="2000"/>
     </mc:Choice>
-    <mc:Fallback>
+    <mc:Fallback xmlns="">
       <p:transition xmlns:p14="http://schemas.microsoft.com/office/powerpoint/2010/main" spd="slow"/>
     </mc:Fallback>
   </mc:AlternateContent>
@@ -29153,11 +29145,11 @@
   <p:clrMapOvr>
     <a:masterClrMapping/>
   </p:clrMapOvr>
-  <mc:AlternateContent xmlns:mc="http://schemas.openxmlformats.org/markup-compatibility/2006">
-    <mc:Choice xmlns:p14="http://schemas.microsoft.com/office/powerpoint/2010/main" Requires="p14">
+  <mc:AlternateContent xmlns:mc="http://schemas.openxmlformats.org/markup-compatibility/2006" xmlns:p14="http://schemas.microsoft.com/office/powerpoint/2010/main">
+    <mc:Choice Requires="p14">
       <p:transition spd="slow" p14:dur="2000"/>
     </mc:Choice>
-    <mc:Fallback>
+    <mc:Fallback xmlns="">
       <p:transition xmlns:p14="http://schemas.microsoft.com/office/powerpoint/2010/main" spd="slow"/>
     </mc:Fallback>
   </mc:AlternateContent>
@@ -30466,11 +30458,11 @@
   <p:clrMapOvr>
     <a:masterClrMapping/>
   </p:clrMapOvr>
-  <mc:AlternateContent xmlns:mc="http://schemas.openxmlformats.org/markup-compatibility/2006">
-    <mc:Choice xmlns:p14="http://schemas.microsoft.com/office/powerpoint/2010/main" Requires="p14">
+  <mc:AlternateContent xmlns:mc="http://schemas.openxmlformats.org/markup-compatibility/2006" xmlns:p14="http://schemas.microsoft.com/office/powerpoint/2010/main">
+    <mc:Choice Requires="p14">
       <p:transition spd="slow" p14:dur="2000"/>
     </mc:Choice>
-    <mc:Fallback>
+    <mc:Fallback xmlns="">
       <p:transition xmlns:p14="http://schemas.microsoft.com/office/powerpoint/2010/main" spd="slow"/>
     </mc:Fallback>
   </mc:AlternateContent>
@@ -31789,11 +31781,11 @@
   <p:clrMapOvr>
     <a:masterClrMapping/>
   </p:clrMapOvr>
-  <mc:AlternateContent xmlns:mc="http://schemas.openxmlformats.org/markup-compatibility/2006">
-    <mc:Choice xmlns:p14="http://schemas.microsoft.com/office/powerpoint/2010/main" Requires="p14">
+  <mc:AlternateContent xmlns:mc="http://schemas.openxmlformats.org/markup-compatibility/2006" xmlns:p14="http://schemas.microsoft.com/office/powerpoint/2010/main">
+    <mc:Choice Requires="p14">
       <p:transition spd="slow" p14:dur="2000"/>
     </mc:Choice>
-    <mc:Fallback>
+    <mc:Fallback xmlns="">
       <p:transition xmlns:p14="http://schemas.microsoft.com/office/powerpoint/2010/main" spd="slow"/>
     </mc:Fallback>
   </mc:AlternateContent>
@@ -33165,11 +33157,11 @@
   <p:clrMapOvr>
     <a:masterClrMapping/>
   </p:clrMapOvr>
-  <mc:AlternateContent xmlns:mc="http://schemas.openxmlformats.org/markup-compatibility/2006">
-    <mc:Choice xmlns:p14="http://schemas.microsoft.com/office/powerpoint/2010/main" Requires="p14">
+  <mc:AlternateContent xmlns:mc="http://schemas.openxmlformats.org/markup-compatibility/2006" xmlns:p14="http://schemas.microsoft.com/office/powerpoint/2010/main">
+    <mc:Choice Requires="p14">
       <p:transition spd="slow" p14:dur="2000"/>
     </mc:Choice>
-    <mc:Fallback>
+    <mc:Fallback xmlns="">
       <p:transition xmlns:p14="http://schemas.microsoft.com/office/powerpoint/2010/main" spd="slow"/>
     </mc:Fallback>
   </mc:AlternateContent>
@@ -34471,11 +34463,11 @@
   <p:clrMapOvr>
     <a:masterClrMapping/>
   </p:clrMapOvr>
-  <mc:AlternateContent xmlns:mc="http://schemas.openxmlformats.org/markup-compatibility/2006">
-    <mc:Choice xmlns:p14="http://schemas.microsoft.com/office/powerpoint/2010/main" Requires="p14">
+  <mc:AlternateContent xmlns:mc="http://schemas.openxmlformats.org/markup-compatibility/2006" xmlns:p14="http://schemas.microsoft.com/office/powerpoint/2010/main">
+    <mc:Choice Requires="p14">
       <p:transition spd="slow" p14:dur="2000"/>
     </mc:Choice>
-    <mc:Fallback>
+    <mc:Fallback xmlns="">
       <p:transition xmlns:p14="http://schemas.microsoft.com/office/powerpoint/2010/main" spd="slow"/>
     </mc:Fallback>
   </mc:AlternateContent>
@@ -34803,11 +34795,11 @@
   <p:clrMapOvr>
     <a:masterClrMapping/>
   </p:clrMapOvr>
-  <mc:AlternateContent xmlns:mc="http://schemas.openxmlformats.org/markup-compatibility/2006">
-    <mc:Choice xmlns:p14="http://schemas.microsoft.com/office/powerpoint/2010/main" Requires="p14">
+  <mc:AlternateContent xmlns:mc="http://schemas.openxmlformats.org/markup-compatibility/2006" xmlns:p14="http://schemas.microsoft.com/office/powerpoint/2010/main">
+    <mc:Choice Requires="p14">
       <p:transition spd="slow" p14:dur="2000"/>
     </mc:Choice>
-    <mc:Fallback>
+    <mc:Fallback xmlns="">
       <p:transition xmlns:p14="http://schemas.microsoft.com/office/powerpoint/2010/main" spd="slow"/>
     </mc:Fallback>
   </mc:AlternateContent>
@@ -34860,11 +34852,7 @@
           <a:p>
             <a:r>
               <a:rPr lang="en-US" dirty="0" smtClean="0"/>
-              <a:t>General </a:t>
-            </a:r>
-            <a:r>
-              <a:rPr lang="en-US" dirty="0" smtClean="0"/>
-              <a:t>Overview</a:t>
+              <a:t>General Overview</a:t>
             </a:r>
             <a:endParaRPr lang="en-US" dirty="0"/>
           </a:p>
@@ -34947,11 +34935,11 @@
   <p:clrMapOvr>
     <a:masterClrMapping/>
   </p:clrMapOvr>
-  <mc:AlternateContent xmlns:mc="http://schemas.openxmlformats.org/markup-compatibility/2006">
-    <mc:Choice xmlns:p14="http://schemas.microsoft.com/office/powerpoint/2010/main" Requires="p14">
+  <mc:AlternateContent xmlns:mc="http://schemas.openxmlformats.org/markup-compatibility/2006" xmlns:p14="http://schemas.microsoft.com/office/powerpoint/2010/main">
+    <mc:Choice Requires="p14">
       <p:transition spd="slow" p14:dur="2000"/>
     </mc:Choice>
-    <mc:Fallback>
+    <mc:Fallback xmlns="">
       <p:transition xmlns:p14="http://schemas.microsoft.com/office/powerpoint/2010/main" spd="slow"/>
     </mc:Fallback>
   </mc:AlternateContent>
@@ -35211,11 +35199,11 @@
   <p:clrMapOvr>
     <a:masterClrMapping/>
   </p:clrMapOvr>
-  <mc:AlternateContent xmlns:mc="http://schemas.openxmlformats.org/markup-compatibility/2006">
-    <mc:Choice xmlns:p14="http://schemas.microsoft.com/office/powerpoint/2010/main" Requires="p14">
+  <mc:AlternateContent xmlns:mc="http://schemas.openxmlformats.org/markup-compatibility/2006" xmlns:p14="http://schemas.microsoft.com/office/powerpoint/2010/main">
+    <mc:Choice Requires="p14">
       <p:transition spd="slow" p14:dur="2000"/>
     </mc:Choice>
-    <mc:Fallback>
+    <mc:Fallback xmlns="">
       <p:transition xmlns:p14="http://schemas.microsoft.com/office/powerpoint/2010/main" spd="slow"/>
     </mc:Fallback>
   </mc:AlternateContent>
@@ -35475,11 +35463,11 @@
   <p:clrMapOvr>
     <a:masterClrMapping/>
   </p:clrMapOvr>
-  <mc:AlternateContent xmlns:mc="http://schemas.openxmlformats.org/markup-compatibility/2006">
-    <mc:Choice xmlns:p14="http://schemas.microsoft.com/office/powerpoint/2010/main" Requires="p14">
+  <mc:AlternateContent xmlns:mc="http://schemas.openxmlformats.org/markup-compatibility/2006" xmlns:p14="http://schemas.microsoft.com/office/powerpoint/2010/main">
+    <mc:Choice Requires="p14">
       <p:transition spd="slow" p14:dur="2000"/>
     </mc:Choice>
-    <mc:Fallback>
+    <mc:Fallback xmlns="">
       <p:transition xmlns:p14="http://schemas.microsoft.com/office/powerpoint/2010/main" spd="slow"/>
     </mc:Fallback>
   </mc:AlternateContent>
@@ -35978,11 +35966,11 @@
   <p:clrMapOvr>
     <a:masterClrMapping/>
   </p:clrMapOvr>
-  <mc:AlternateContent xmlns:mc="http://schemas.openxmlformats.org/markup-compatibility/2006">
-    <mc:Choice xmlns:p14="http://schemas.microsoft.com/office/powerpoint/2010/main" Requires="p14">
+  <mc:AlternateContent xmlns:mc="http://schemas.openxmlformats.org/markup-compatibility/2006" xmlns:p14="http://schemas.microsoft.com/office/powerpoint/2010/main">
+    <mc:Choice Requires="p14">
       <p:transition spd="slow" p14:dur="2000"/>
     </mc:Choice>
-    <mc:Fallback>
+    <mc:Fallback xmlns="">
       <p:transition xmlns:p14="http://schemas.microsoft.com/office/powerpoint/2010/main" spd="slow"/>
     </mc:Fallback>
   </mc:AlternateContent>
@@ -36162,11 +36150,11 @@
   <p:clrMapOvr>
     <a:masterClrMapping/>
   </p:clrMapOvr>
-  <mc:AlternateContent xmlns:mc="http://schemas.openxmlformats.org/markup-compatibility/2006">
-    <mc:Choice xmlns:p14="http://schemas.microsoft.com/office/powerpoint/2010/main" Requires="p14">
+  <mc:AlternateContent xmlns:mc="http://schemas.openxmlformats.org/markup-compatibility/2006" xmlns:p14="http://schemas.microsoft.com/office/powerpoint/2010/main">
+    <mc:Choice Requires="p14">
       <p:transition spd="slow" p14:dur="2000"/>
     </mc:Choice>
-    <mc:Fallback>
+    <mc:Fallback xmlns="">
       <p:transition xmlns:p14="http://schemas.microsoft.com/office/powerpoint/2010/main" spd="slow"/>
     </mc:Fallback>
   </mc:AlternateContent>
@@ -36302,11 +36290,11 @@
   <p:clrMapOvr>
     <a:masterClrMapping/>
   </p:clrMapOvr>
-  <mc:AlternateContent xmlns:mc="http://schemas.openxmlformats.org/markup-compatibility/2006">
-    <mc:Choice xmlns:p14="http://schemas.microsoft.com/office/powerpoint/2010/main" Requires="p14">
+  <mc:AlternateContent xmlns:mc="http://schemas.openxmlformats.org/markup-compatibility/2006" xmlns:p14="http://schemas.microsoft.com/office/powerpoint/2010/main">
+    <mc:Choice Requires="p14">
       <p:transition spd="slow" p14:dur="2000"/>
     </mc:Choice>
-    <mc:Fallback>
+    <mc:Fallback xmlns="">
       <p:transition xmlns:p14="http://schemas.microsoft.com/office/powerpoint/2010/main" spd="slow"/>
     </mc:Fallback>
   </mc:AlternateContent>
@@ -36610,11 +36598,11 @@
   <p:clrMapOvr>
     <a:masterClrMapping/>
   </p:clrMapOvr>
-  <mc:AlternateContent xmlns:mc="http://schemas.openxmlformats.org/markup-compatibility/2006">
-    <mc:Choice xmlns:p14="http://schemas.microsoft.com/office/powerpoint/2010/main" Requires="p14">
+  <mc:AlternateContent xmlns:mc="http://schemas.openxmlformats.org/markup-compatibility/2006" xmlns:p14="http://schemas.microsoft.com/office/powerpoint/2010/main">
+    <mc:Choice Requires="p14">
       <p:transition spd="slow" p14:dur="2000"/>
     </mc:Choice>
-    <mc:Fallback>
+    <mc:Fallback xmlns="">
       <p:transition xmlns:p14="http://schemas.microsoft.com/office/powerpoint/2010/main" spd="slow"/>
     </mc:Fallback>
   </mc:AlternateContent>
@@ -36693,17 +36681,7 @@
                   </a:schemeClr>
                 </a:solidFill>
               </a:rPr>
-              <a:t>Debugging </a:t>
-            </a:r>
-            <a:r>
-              <a:rPr lang="en-US" dirty="0" smtClean="0">
-                <a:solidFill>
-                  <a:schemeClr val="accent2">
-                    <a:lumMod val="50000"/>
-                  </a:schemeClr>
-                </a:solidFill>
-              </a:rPr>
-              <a:t>for overflows</a:t>
+              <a:t>Debugging for overflows</a:t>
             </a:r>
           </a:p>
           <a:p>
@@ -36848,11 +36826,11 @@
   <p:clrMapOvr>
     <a:masterClrMapping/>
   </p:clrMapOvr>
-  <mc:AlternateContent xmlns:mc="http://schemas.openxmlformats.org/markup-compatibility/2006">
-    <mc:Choice xmlns:p14="http://schemas.microsoft.com/office/powerpoint/2010/main" Requires="p14">
+  <mc:AlternateContent xmlns:mc="http://schemas.openxmlformats.org/markup-compatibility/2006" xmlns:p14="http://schemas.microsoft.com/office/powerpoint/2010/main">
+    <mc:Choice Requires="p14">
       <p:transition spd="slow" p14:dur="2000"/>
     </mc:Choice>
-    <mc:Fallback>
+    <mc:Fallback xmlns="">
       <p:transition xmlns:p14="http://schemas.microsoft.com/office/powerpoint/2010/main" spd="slow"/>
     </mc:Fallback>
   </mc:AlternateContent>
@@ -36931,17 +36909,7 @@
                   </a:schemeClr>
                 </a:solidFill>
               </a:rPr>
-              <a:t>Debugging </a:t>
-            </a:r>
-            <a:r>
-              <a:rPr lang="en-US" dirty="0" smtClean="0">
-                <a:solidFill>
-                  <a:schemeClr val="accent2">
-                    <a:lumMod val="50000"/>
-                  </a:schemeClr>
-                </a:solidFill>
-              </a:rPr>
-              <a:t>for overflows</a:t>
+              <a:t>Debugging for overflows</a:t>
             </a:r>
             <a:endParaRPr lang="en-US" dirty="0">
               <a:solidFill>
@@ -37086,11 +37054,11 @@
   <p:clrMapOvr>
     <a:masterClrMapping/>
   </p:clrMapOvr>
-  <mc:AlternateContent xmlns:mc="http://schemas.openxmlformats.org/markup-compatibility/2006">
-    <mc:Choice xmlns:p14="http://schemas.microsoft.com/office/powerpoint/2010/main" Requires="p14">
+  <mc:AlternateContent xmlns:mc="http://schemas.openxmlformats.org/markup-compatibility/2006" xmlns:p14="http://schemas.microsoft.com/office/powerpoint/2010/main">
+    <mc:Choice Requires="p14">
       <p:transition spd="slow" p14:dur="2000"/>
     </mc:Choice>
-    <mc:Fallback>
+    <mc:Fallback xmlns="">
       <p:transition xmlns:p14="http://schemas.microsoft.com/office/powerpoint/2010/main" spd="slow"/>
     </mc:Fallback>
   </mc:AlternateContent>
@@ -37189,47 +37157,7 @@
                   </a:schemeClr>
                 </a:solidFill>
               </a:rPr>
-              <a:t>disassemble &lt;</a:t>
-            </a:r>
-            <a:r>
-              <a:rPr lang="en-US" dirty="0" smtClean="0">
-                <a:solidFill>
-                  <a:schemeClr val="accent2">
-                    <a:lumMod val="50000"/>
-                  </a:schemeClr>
-                </a:solidFill>
-              </a:rPr>
-              <a:t>symbol&gt;</a:t>
-            </a:r>
-            <a:r>
-              <a:rPr lang="en-US" dirty="0" smtClean="0">
-                <a:solidFill>
-                  <a:schemeClr val="accent2">
-                    <a:lumMod val="50000"/>
-                  </a:schemeClr>
-                </a:solidFill>
-              </a:rPr>
-              <a:t>  -</a:t>
-            </a:r>
-            <a:r>
-              <a:rPr lang="en-US" dirty="0" smtClean="0">
-                <a:solidFill>
-                  <a:schemeClr val="accent2">
-                    <a:lumMod val="50000"/>
-                  </a:schemeClr>
-                </a:solidFill>
-              </a:rPr>
-              <a:t>Dumps </a:t>
-            </a:r>
-            <a:r>
-              <a:rPr lang="en-US" dirty="0" smtClean="0">
-                <a:solidFill>
-                  <a:schemeClr val="accent2">
-                    <a:lumMod val="50000"/>
-                  </a:schemeClr>
-                </a:solidFill>
-              </a:rPr>
-              <a:t>the disassembly for a symbol</a:t>
+              <a:t>disassemble &lt;symbol&gt;  -Dumps the disassembly for a symbol</a:t>
             </a:r>
           </a:p>
           <a:p>
@@ -37318,11 +37246,11 @@
   <p:clrMapOvr>
     <a:masterClrMapping/>
   </p:clrMapOvr>
-  <mc:AlternateContent xmlns:mc="http://schemas.openxmlformats.org/markup-compatibility/2006">
-    <mc:Choice xmlns:p14="http://schemas.microsoft.com/office/powerpoint/2010/main" Requires="p14">
+  <mc:AlternateContent xmlns:mc="http://schemas.openxmlformats.org/markup-compatibility/2006" xmlns:p14="http://schemas.microsoft.com/office/powerpoint/2010/main">
+    <mc:Choice Requires="p14">
       <p:transition spd="slow" p14:dur="2000"/>
     </mc:Choice>
-    <mc:Fallback>
+    <mc:Fallback xmlns="">
       <p:transition xmlns:p14="http://schemas.microsoft.com/office/powerpoint/2010/main" spd="slow"/>
     </mc:Fallback>
   </mc:AlternateContent>
@@ -37673,11 +37601,11 @@
   <p:clrMapOvr>
     <a:masterClrMapping/>
   </p:clrMapOvr>
-  <mc:AlternateContent xmlns:mc="http://schemas.openxmlformats.org/markup-compatibility/2006">
-    <mc:Choice xmlns:p14="http://schemas.microsoft.com/office/powerpoint/2010/main" Requires="p14">
+  <mc:AlternateContent xmlns:mc="http://schemas.openxmlformats.org/markup-compatibility/2006" xmlns:p14="http://schemas.microsoft.com/office/powerpoint/2010/main">
+    <mc:Choice Requires="p14">
       <p:transition spd="slow" p14:dur="2000"/>
     </mc:Choice>
-    <mc:Fallback>
+    <mc:Fallback xmlns="">
       <p:transition xmlns:p14="http://schemas.microsoft.com/office/powerpoint/2010/main" spd="slow"/>
     </mc:Fallback>
   </mc:AlternateContent>
@@ -37829,11 +37757,11 @@
   <p:clrMapOvr>
     <a:masterClrMapping/>
   </p:clrMapOvr>
-  <mc:AlternateContent xmlns:mc="http://schemas.openxmlformats.org/markup-compatibility/2006">
-    <mc:Choice xmlns:p14="http://schemas.microsoft.com/office/powerpoint/2010/main" Requires="p14">
+  <mc:AlternateContent xmlns:mc="http://schemas.openxmlformats.org/markup-compatibility/2006" xmlns:p14="http://schemas.microsoft.com/office/powerpoint/2010/main">
+    <mc:Choice Requires="p14">
       <p:transition spd="slow" p14:dur="2000"/>
     </mc:Choice>
-    <mc:Fallback>
+    <mc:Fallback xmlns="">
       <p:transition xmlns:p14="http://schemas.microsoft.com/office/powerpoint/2010/main" spd="slow"/>
     </mc:Fallback>
   </mc:AlternateContent>
@@ -37989,11 +37917,11 @@
   <p:clrMapOvr>
     <a:masterClrMapping/>
   </p:clrMapOvr>
-  <mc:AlternateContent xmlns:mc="http://schemas.openxmlformats.org/markup-compatibility/2006">
-    <mc:Choice xmlns:p14="http://schemas.microsoft.com/office/powerpoint/2010/main" Requires="p14">
+  <mc:AlternateContent xmlns:mc="http://schemas.openxmlformats.org/markup-compatibility/2006" xmlns:p14="http://schemas.microsoft.com/office/powerpoint/2010/main">
+    <mc:Choice Requires="p14">
       <p:transition spd="slow" p14:dur="2000"/>
     </mc:Choice>
-    <mc:Fallback>
+    <mc:Fallback xmlns="">
       <p:transition xmlns:p14="http://schemas.microsoft.com/office/powerpoint/2010/main" spd="slow"/>
     </mc:Fallback>
   </mc:AlternateContent>
@@ -38058,11 +37986,11 @@
   <p:clrMapOvr>
     <a:masterClrMapping/>
   </p:clrMapOvr>
-  <mc:AlternateContent xmlns:mc="http://schemas.openxmlformats.org/markup-compatibility/2006">
-    <mc:Choice xmlns:p14="http://schemas.microsoft.com/office/powerpoint/2010/main" Requires="p14">
+  <mc:AlternateContent xmlns:mc="http://schemas.openxmlformats.org/markup-compatibility/2006" xmlns:p14="http://schemas.microsoft.com/office/powerpoint/2010/main">
+    <mc:Choice Requires="p14">
       <p:transition spd="slow" p14:dur="2000"/>
     </mc:Choice>
-    <mc:Fallback>
+    <mc:Fallback xmlns="">
       <p:transition xmlns:p14="http://schemas.microsoft.com/office/powerpoint/2010/main" spd="slow"/>
     </mc:Fallback>
   </mc:AlternateContent>
@@ -38120,11 +38048,7 @@
             </a:r>
             <a:r>
               <a:rPr lang="en-US" smtClean="0"/>
-              <a:t> </a:t>
-            </a:r>
-            <a:r>
-              <a:rPr lang="en-US" smtClean="0"/>
-              <a:t>Attack</a:t>
+              <a:t> Attack</a:t>
             </a:r>
             <a:endParaRPr lang="en-US" dirty="0"/>
           </a:p>
@@ -38280,11 +38204,11 @@
   <p:clrMapOvr>
     <a:masterClrMapping/>
   </p:clrMapOvr>
-  <mc:AlternateContent xmlns:mc="http://schemas.openxmlformats.org/markup-compatibility/2006">
-    <mc:Choice xmlns:p14="http://schemas.microsoft.com/office/powerpoint/2010/main" Requires="p14">
+  <mc:AlternateContent xmlns:mc="http://schemas.openxmlformats.org/markup-compatibility/2006" xmlns:p14="http://schemas.microsoft.com/office/powerpoint/2010/main">
+    <mc:Choice Requires="p14">
       <p:transition spd="slow" p14:dur="2000"/>
     </mc:Choice>
-    <mc:Fallback>
+    <mc:Fallback xmlns="">
       <p:transition xmlns:p14="http://schemas.microsoft.com/office/powerpoint/2010/main" spd="slow"/>
     </mc:Fallback>
   </mc:AlternateContent>
@@ -38470,11 +38394,11 @@
   <p:clrMapOvr>
     <a:masterClrMapping/>
   </p:clrMapOvr>
-  <mc:AlternateContent xmlns:mc="http://schemas.openxmlformats.org/markup-compatibility/2006">
-    <mc:Choice xmlns:p14="http://schemas.microsoft.com/office/powerpoint/2010/main" Requires="p14">
+  <mc:AlternateContent xmlns:mc="http://schemas.openxmlformats.org/markup-compatibility/2006" xmlns:p14="http://schemas.microsoft.com/office/powerpoint/2010/main">
+    <mc:Choice Requires="p14">
       <p:transition spd="slow" p14:dur="2000"/>
     </mc:Choice>
-    <mc:Fallback>
+    <mc:Fallback xmlns="">
       <p:transition xmlns:p14="http://schemas.microsoft.com/office/powerpoint/2010/main" spd="slow"/>
     </mc:Fallback>
   </mc:AlternateContent>
@@ -38634,11 +38558,11 @@
   <p:clrMapOvr>
     <a:masterClrMapping/>
   </p:clrMapOvr>
-  <mc:AlternateContent xmlns:mc="http://schemas.openxmlformats.org/markup-compatibility/2006">
-    <mc:Choice xmlns:p14="http://schemas.microsoft.com/office/powerpoint/2010/main" Requires="p14">
+  <mc:AlternateContent xmlns:mc="http://schemas.openxmlformats.org/markup-compatibility/2006" xmlns:p14="http://schemas.microsoft.com/office/powerpoint/2010/main">
+    <mc:Choice Requires="p14">
       <p:transition spd="slow" p14:dur="2000"/>
     </mc:Choice>
-    <mc:Fallback>
+    <mc:Fallback xmlns="">
       <p:transition xmlns:p14="http://schemas.microsoft.com/office/powerpoint/2010/main" spd="slow"/>
     </mc:Fallback>
   </mc:AlternateContent>
@@ -38747,11 +38671,11 @@
   <p:clrMapOvr>
     <a:masterClrMapping/>
   </p:clrMapOvr>
-  <mc:AlternateContent xmlns:mc="http://schemas.openxmlformats.org/markup-compatibility/2006">
-    <mc:Choice xmlns:p14="http://schemas.microsoft.com/office/powerpoint/2010/main" Requires="p14">
+  <mc:AlternateContent xmlns:mc="http://schemas.openxmlformats.org/markup-compatibility/2006" xmlns:p14="http://schemas.microsoft.com/office/powerpoint/2010/main">
+    <mc:Choice Requires="p14">
       <p:transition spd="slow" p14:dur="2000"/>
     </mc:Choice>
-    <mc:Fallback>
+    <mc:Fallback xmlns="">
       <p:transition xmlns:p14="http://schemas.microsoft.com/office/powerpoint/2010/main" spd="slow"/>
     </mc:Fallback>
   </mc:AlternateContent>
@@ -38898,11 +38822,11 @@
   <p:clrMapOvr>
     <a:masterClrMapping/>
   </p:clrMapOvr>
-  <mc:AlternateContent xmlns:mc="http://schemas.openxmlformats.org/markup-compatibility/2006">
-    <mc:Choice xmlns:p14="http://schemas.microsoft.com/office/powerpoint/2010/main" Requires="p14">
+  <mc:AlternateContent xmlns:mc="http://schemas.openxmlformats.org/markup-compatibility/2006" xmlns:p14="http://schemas.microsoft.com/office/powerpoint/2010/main">
+    <mc:Choice Requires="p14">
       <p:transition spd="slow" p14:dur="2000"/>
     </mc:Choice>
-    <mc:Fallback>
+    <mc:Fallback xmlns="">
       <p:transition xmlns:p14="http://schemas.microsoft.com/office/powerpoint/2010/main" spd="slow"/>
     </mc:Fallback>
   </mc:AlternateContent>
@@ -39033,11 +38957,11 @@
   <p:clrMapOvr>
     <a:masterClrMapping/>
   </p:clrMapOvr>
-  <mc:AlternateContent xmlns:mc="http://schemas.openxmlformats.org/markup-compatibility/2006">
-    <mc:Choice xmlns:p14="http://schemas.microsoft.com/office/powerpoint/2010/main" Requires="p14">
+  <mc:AlternateContent xmlns:mc="http://schemas.openxmlformats.org/markup-compatibility/2006" xmlns:p14="http://schemas.microsoft.com/office/powerpoint/2010/main">
+    <mc:Choice Requires="p14">
       <p:transition spd="slow" p14:dur="2000"/>
     </mc:Choice>
-    <mc:Fallback>
+    <mc:Fallback xmlns="">
       <p:transition xmlns:p14="http://schemas.microsoft.com/office/powerpoint/2010/main" spd="slow"/>
     </mc:Fallback>
   </mc:AlternateContent>
@@ -39396,11 +39320,11 @@
   <p:clrMapOvr>
     <a:masterClrMapping/>
   </p:clrMapOvr>
-  <mc:AlternateContent xmlns:mc="http://schemas.openxmlformats.org/markup-compatibility/2006">
-    <mc:Choice xmlns:p14="http://schemas.microsoft.com/office/powerpoint/2010/main" Requires="p14">
+  <mc:AlternateContent xmlns:mc="http://schemas.openxmlformats.org/markup-compatibility/2006" xmlns:p14="http://schemas.microsoft.com/office/powerpoint/2010/main">
+    <mc:Choice Requires="p14">
       <p:transition spd="slow" p14:dur="2000"/>
     </mc:Choice>
-    <mc:Fallback>
+    <mc:Fallback xmlns="">
       <p:transition xmlns:p14="http://schemas.microsoft.com/office/powerpoint/2010/main" spd="slow"/>
     </mc:Fallback>
   </mc:AlternateContent>
@@ -39616,11 +39540,11 @@
   <p:clrMapOvr>
     <a:masterClrMapping/>
   </p:clrMapOvr>
-  <mc:AlternateContent xmlns:mc="http://schemas.openxmlformats.org/markup-compatibility/2006">
-    <mc:Choice xmlns:p14="http://schemas.microsoft.com/office/powerpoint/2010/main" Requires="p14">
+  <mc:AlternateContent xmlns:mc="http://schemas.openxmlformats.org/markup-compatibility/2006" xmlns:p14="http://schemas.microsoft.com/office/powerpoint/2010/main">
+    <mc:Choice Requires="p14">
       <p:transition spd="slow" p14:dur="2000"/>
     </mc:Choice>
-    <mc:Fallback>
+    <mc:Fallback xmlns="">
       <p:transition xmlns:p14="http://schemas.microsoft.com/office/powerpoint/2010/main" spd="slow"/>
     </mc:Fallback>
   </mc:AlternateContent>
@@ -39773,11 +39697,11 @@
   <p:clrMapOvr>
     <a:masterClrMapping/>
   </p:clrMapOvr>
-  <mc:AlternateContent xmlns:mc="http://schemas.openxmlformats.org/markup-compatibility/2006">
-    <mc:Choice xmlns:p14="http://schemas.microsoft.com/office/powerpoint/2010/main" Requires="p14">
+  <mc:AlternateContent xmlns:mc="http://schemas.openxmlformats.org/markup-compatibility/2006" xmlns:p14="http://schemas.microsoft.com/office/powerpoint/2010/main">
+    <mc:Choice Requires="p14">
       <p:transition spd="slow" p14:dur="2000"/>
     </mc:Choice>
-    <mc:Fallback>
+    <mc:Fallback xmlns="">
       <p:transition xmlns:p14="http://schemas.microsoft.com/office/powerpoint/2010/main" spd="slow"/>
     </mc:Fallback>
   </mc:AlternateContent>
@@ -40004,11 +39928,11 @@
   <p:clrMapOvr>
     <a:masterClrMapping/>
   </p:clrMapOvr>
-  <mc:AlternateContent xmlns:mc="http://schemas.openxmlformats.org/markup-compatibility/2006">
-    <mc:Choice xmlns:p14="http://schemas.microsoft.com/office/powerpoint/2010/main" Requires="p14">
+  <mc:AlternateContent xmlns:mc="http://schemas.openxmlformats.org/markup-compatibility/2006" xmlns:p14="http://schemas.microsoft.com/office/powerpoint/2010/main">
+    <mc:Choice Requires="p14">
       <p:transition spd="slow" p14:dur="2000"/>
     </mc:Choice>
-    <mc:Fallback>
+    <mc:Fallback xmlns="">
       <p:transition xmlns:p14="http://schemas.microsoft.com/office/powerpoint/2010/main" spd="slow"/>
     </mc:Fallback>
   </mc:AlternateContent>
@@ -40183,11 +40107,11 @@
   <p:clrMapOvr>
     <a:masterClrMapping/>
   </p:clrMapOvr>
-  <mc:AlternateContent xmlns:mc="http://schemas.openxmlformats.org/markup-compatibility/2006">
-    <mc:Choice xmlns:p14="http://schemas.microsoft.com/office/powerpoint/2010/main" Requires="p14">
+  <mc:AlternateContent xmlns:mc="http://schemas.openxmlformats.org/markup-compatibility/2006" xmlns:p14="http://schemas.microsoft.com/office/powerpoint/2010/main">
+    <mc:Choice Requires="p14">
       <p:transition spd="slow" p14:dur="2000"/>
     </mc:Choice>
-    <mc:Fallback>
+    <mc:Fallback xmlns="">
       <p:transition xmlns:p14="http://schemas.microsoft.com/office/powerpoint/2010/main" spd="slow"/>
     </mc:Fallback>
   </mc:AlternateContent>
@@ -40378,11 +40302,11 @@
   <p:clrMapOvr>
     <a:masterClrMapping/>
   </p:clrMapOvr>
-  <mc:AlternateContent xmlns:mc="http://schemas.openxmlformats.org/markup-compatibility/2006">
-    <mc:Choice xmlns:p14="http://schemas.microsoft.com/office/powerpoint/2010/main" Requires="p14">
+  <mc:AlternateContent xmlns:mc="http://schemas.openxmlformats.org/markup-compatibility/2006" xmlns:p14="http://schemas.microsoft.com/office/powerpoint/2010/main">
+    <mc:Choice Requires="p14">
       <p:transition spd="slow" p14:dur="2000"/>
     </mc:Choice>
-    <mc:Fallback>
+    <mc:Fallback xmlns="">
       <p:transition xmlns:p14="http://schemas.microsoft.com/office/powerpoint/2010/main" spd="slow"/>
     </mc:Fallback>
   </mc:AlternateContent>
@@ -40553,11 +40477,11 @@
   <p:clrMapOvr>
     <a:masterClrMapping/>
   </p:clrMapOvr>
-  <mc:AlternateContent xmlns:mc="http://schemas.openxmlformats.org/markup-compatibility/2006">
-    <mc:Choice xmlns:p14="http://schemas.microsoft.com/office/powerpoint/2010/main" Requires="p14">
+  <mc:AlternateContent xmlns:mc="http://schemas.openxmlformats.org/markup-compatibility/2006" xmlns:p14="http://schemas.microsoft.com/office/powerpoint/2010/main">
+    <mc:Choice Requires="p14">
       <p:transition spd="slow" p14:dur="2000"/>
     </mc:Choice>
-    <mc:Fallback>
+    <mc:Fallback xmlns="">
       <p:transition xmlns:p14="http://schemas.microsoft.com/office/powerpoint/2010/main" spd="slow"/>
     </mc:Fallback>
   </mc:AlternateContent>
@@ -40789,11 +40713,11 @@
   <p:clrMapOvr>
     <a:masterClrMapping/>
   </p:clrMapOvr>
-  <mc:AlternateContent xmlns:mc="http://schemas.openxmlformats.org/markup-compatibility/2006">
-    <mc:Choice xmlns:p14="http://schemas.microsoft.com/office/powerpoint/2010/main" Requires="p14">
+  <mc:AlternateContent xmlns:mc="http://schemas.openxmlformats.org/markup-compatibility/2006" xmlns:p14="http://schemas.microsoft.com/office/powerpoint/2010/main">
+    <mc:Choice Requires="p14">
       <p:transition spd="slow" p14:dur="2000"/>
     </mc:Choice>
-    <mc:Fallback>
+    <mc:Fallback xmlns="">
       <p:transition xmlns:p14="http://schemas.microsoft.com/office/powerpoint/2010/main" spd="slow"/>
     </mc:Fallback>
   </mc:AlternateContent>

</xml_diff>